<commit_message>
Finished presentation and worked on paper
</commit_message>
<xml_diff>
--- a/Presentation/OrbitalDebrisPresentation.pptx
+++ b/Presentation/OrbitalDebrisPresentation.pptx
@@ -5,17 +5,18 @@
     <p:sldMasterId id="2147483648" r:id="rId1"/>
   </p:sldMasterIdLst>
   <p:notesMasterIdLst>
-    <p:notesMasterId r:id="rId10"/>
+    <p:notesMasterId r:id="rId11"/>
   </p:notesMasterIdLst>
   <p:sldIdLst>
     <p:sldId id="256" r:id="rId2"/>
-    <p:sldId id="257" r:id="rId3"/>
-    <p:sldId id="262" r:id="rId4"/>
-    <p:sldId id="263" r:id="rId5"/>
-    <p:sldId id="264" r:id="rId6"/>
-    <p:sldId id="265" r:id="rId7"/>
-    <p:sldId id="266" r:id="rId8"/>
-    <p:sldId id="261" r:id="rId9"/>
+    <p:sldId id="267" r:id="rId3"/>
+    <p:sldId id="257" r:id="rId4"/>
+    <p:sldId id="262" r:id="rId5"/>
+    <p:sldId id="263" r:id="rId6"/>
+    <p:sldId id="264" r:id="rId7"/>
+    <p:sldId id="265" r:id="rId8"/>
+    <p:sldId id="266" r:id="rId9"/>
+    <p:sldId id="261" r:id="rId10"/>
   </p:sldIdLst>
   <p:sldSz cx="12192000" cy="6858000"/>
   <p:notesSz cx="6858000" cy="9144000"/>
@@ -2286,7 +2287,7 @@
           <a:p>
             <a:fld id="{222597E0-90FD-CF4C-8A28-806BAB807E22}" type="datetimeFigureOut">
               <a:rPr lang="en-US" smtClean="0"/>
-              <a:t>4/5/19</a:t>
+              <a:t>4/9/2019</a:t>
             </a:fld>
             <a:endParaRPr lang="en-US"/>
           </a:p>
@@ -2618,7 +2619,7 @@
           <a:p>
             <a:fld id="{4AF53B3C-537F-8B43-9E81-0C9573495E45}" type="slidenum">
               <a:rPr lang="en-US" smtClean="0"/>
-              <a:t>6</a:t>
+              <a:t>7</a:t>
             </a:fld>
             <a:endParaRPr lang="en-US"/>
           </a:p>
@@ -2784,7 +2785,7 @@
           <a:p>
             <a:fld id="{24921E90-DCBB-3C4E-9920-10E8BF6775BE}" type="datetimeFigureOut">
               <a:rPr lang="en-US" smtClean="0"/>
-              <a:t>4/5/19</a:t>
+              <a:t>4/9/2019</a:t>
             </a:fld>
             <a:endParaRPr lang="en-US"/>
           </a:p>
@@ -2994,7 +2995,7 @@
           <a:p>
             <a:fld id="{24921E90-DCBB-3C4E-9920-10E8BF6775BE}" type="datetimeFigureOut">
               <a:rPr lang="en-US" smtClean="0"/>
-              <a:t>4/5/19</a:t>
+              <a:t>4/9/2019</a:t>
             </a:fld>
             <a:endParaRPr lang="en-US"/>
           </a:p>
@@ -3214,7 +3215,7 @@
           <a:p>
             <a:fld id="{24921E90-DCBB-3C4E-9920-10E8BF6775BE}" type="datetimeFigureOut">
               <a:rPr lang="en-US" smtClean="0"/>
-              <a:t>4/5/19</a:t>
+              <a:t>4/9/2019</a:t>
             </a:fld>
             <a:endParaRPr lang="en-US"/>
           </a:p>
@@ -3424,7 +3425,7 @@
           <a:p>
             <a:fld id="{24921E90-DCBB-3C4E-9920-10E8BF6775BE}" type="datetimeFigureOut">
               <a:rPr lang="en-US" smtClean="0"/>
-              <a:t>4/5/19</a:t>
+              <a:t>4/9/2019</a:t>
             </a:fld>
             <a:endParaRPr lang="en-US"/>
           </a:p>
@@ -3711,7 +3712,7 @@
           <a:p>
             <a:fld id="{24921E90-DCBB-3C4E-9920-10E8BF6775BE}" type="datetimeFigureOut">
               <a:rPr lang="en-US" smtClean="0"/>
-              <a:t>4/5/19</a:t>
+              <a:t>4/9/2019</a:t>
             </a:fld>
             <a:endParaRPr lang="en-US"/>
           </a:p>
@@ -3988,7 +3989,7 @@
           <a:p>
             <a:fld id="{24921E90-DCBB-3C4E-9920-10E8BF6775BE}" type="datetimeFigureOut">
               <a:rPr lang="en-US" smtClean="0"/>
-              <a:t>4/5/19</a:t>
+              <a:t>4/9/2019</a:t>
             </a:fld>
             <a:endParaRPr lang="en-US"/>
           </a:p>
@@ -4412,7 +4413,7 @@
           <a:p>
             <a:fld id="{24921E90-DCBB-3C4E-9920-10E8BF6775BE}" type="datetimeFigureOut">
               <a:rPr lang="en-US" smtClean="0"/>
-              <a:t>4/5/19</a:t>
+              <a:t>4/9/2019</a:t>
             </a:fld>
             <a:endParaRPr lang="en-US"/>
           </a:p>
@@ -4565,7 +4566,7 @@
           <a:p>
             <a:fld id="{24921E90-DCBB-3C4E-9920-10E8BF6775BE}" type="datetimeFigureOut">
               <a:rPr lang="en-US" smtClean="0"/>
-              <a:t>4/5/19</a:t>
+              <a:t>4/9/2019</a:t>
             </a:fld>
             <a:endParaRPr lang="en-US"/>
           </a:p>
@@ -4690,7 +4691,7 @@
           <a:p>
             <a:fld id="{24921E90-DCBB-3C4E-9920-10E8BF6775BE}" type="datetimeFigureOut">
               <a:rPr lang="en-US" smtClean="0"/>
-              <a:t>4/5/19</a:t>
+              <a:t>4/9/2019</a:t>
             </a:fld>
             <a:endParaRPr lang="en-US"/>
           </a:p>
@@ -5013,7 +5014,7 @@
           <a:p>
             <a:fld id="{24921E90-DCBB-3C4E-9920-10E8BF6775BE}" type="datetimeFigureOut">
               <a:rPr lang="en-US" smtClean="0"/>
-              <a:t>4/5/19</a:t>
+              <a:t>4/9/2019</a:t>
             </a:fld>
             <a:endParaRPr lang="en-US"/>
           </a:p>
@@ -5313,7 +5314,7 @@
           <a:p>
             <a:fld id="{24921E90-DCBB-3C4E-9920-10E8BF6775BE}" type="datetimeFigureOut">
               <a:rPr lang="en-US" smtClean="0"/>
-              <a:t>4/5/19</a:t>
+              <a:t>4/9/2019</a:t>
             </a:fld>
             <a:endParaRPr lang="en-US"/>
           </a:p>
@@ -5572,7 +5573,7 @@
           <a:p>
             <a:fld id="{24921E90-DCBB-3C4E-9920-10E8BF6775BE}" type="datetimeFigureOut">
               <a:rPr lang="en-US" smtClean="0"/>
-              <a:t>4/5/19</a:t>
+              <a:t>4/9/2019</a:t>
             </a:fld>
             <a:endParaRPr lang="en-US"/>
           </a:p>
@@ -6041,7 +6042,7 @@
           <a:p>
             <a:r>
               <a:rPr lang="en-US" dirty="0"/>
-              <a:t>Orbit Space Debris and its Effect on Climate</a:t>
+              <a:t>Orbit Debris and its Effect on Insolation</a:t>
             </a:r>
           </a:p>
         </p:txBody>
@@ -6251,6 +6252,432 @@
 </file>
 
 <file path=ppt/slides/slide2.xml><?xml version="1.0" encoding="utf-8"?>
+<p:sld xmlns:a="http://schemas.openxmlformats.org/drawingml/2006/main" xmlns:r="http://schemas.openxmlformats.org/officeDocument/2006/relationships" xmlns:p="http://schemas.openxmlformats.org/presentationml/2006/main">
+  <p:cSld>
+    <p:bg>
+      <p:bgPr>
+        <a:solidFill>
+          <a:schemeClr val="bg1"/>
+        </a:solidFill>
+        <a:effectLst/>
+      </p:bgPr>
+    </p:bg>
+    <p:spTree>
+      <p:nvGrpSpPr>
+        <p:cNvPr id="1" name=""/>
+        <p:cNvGrpSpPr/>
+        <p:nvPr/>
+      </p:nvGrpSpPr>
+      <p:grpSpPr>
+        <a:xfrm>
+          <a:off x="0" y="0"/>
+          <a:ext cx="0" cy="0"/>
+          <a:chOff x="0" y="0"/>
+          <a:chExt cx="0" cy="0"/>
+        </a:xfrm>
+      </p:grpSpPr>
+      <p:pic>
+        <p:nvPicPr>
+          <p:cNvPr id="3" name="Picture 2">
+            <a:extLst>
+              <a:ext uri="{FF2B5EF4-FFF2-40B4-BE49-F238E27FC236}">
+                <a16:creationId xmlns:a16="http://schemas.microsoft.com/office/drawing/2014/main" id="{5E8B7946-E190-4809-9CC7-A21D1BC5FC42}"/>
+              </a:ext>
+            </a:extLst>
+          </p:cNvPr>
+          <p:cNvPicPr>
+            <a:picLocks noChangeAspect="1"/>
+          </p:cNvPicPr>
+          <p:nvPr/>
+        </p:nvPicPr>
+        <p:blipFill rotWithShape="1">
+          <a:blip r:embed="rId2"/>
+          <a:srcRect t="4492" b="10922"/>
+          <a:stretch/>
+        </p:blipFill>
+        <p:spPr>
+          <a:xfrm>
+            <a:off x="20" y="10"/>
+            <a:ext cx="12191980" cy="6857990"/>
+          </a:xfrm>
+          <a:prstGeom prst="rect">
+            <a:avLst/>
+          </a:prstGeom>
+        </p:spPr>
+      </p:pic>
+      <p:sp>
+        <p:nvSpPr>
+          <p:cNvPr id="4" name="Rectangle 3">
+            <a:extLst>
+              <a:ext uri="{FF2B5EF4-FFF2-40B4-BE49-F238E27FC236}">
+                <a16:creationId xmlns:a16="http://schemas.microsoft.com/office/drawing/2014/main" id="{73C3A0A1-2EB9-4B97-86AC-F299B46EE21B}"/>
+              </a:ext>
+            </a:extLst>
+          </p:cNvPr>
+          <p:cNvSpPr/>
+          <p:nvPr/>
+        </p:nvSpPr>
+        <p:spPr>
+          <a:xfrm>
+            <a:off x="0" y="0"/>
+            <a:ext cx="12191980" cy="6857990"/>
+          </a:xfrm>
+          <a:prstGeom prst="rect">
+            <a:avLst/>
+          </a:prstGeom>
+          <a:solidFill>
+            <a:schemeClr val="tx1">
+              <a:alpha val="50000"/>
+            </a:schemeClr>
+          </a:solidFill>
+          <a:ln>
+            <a:noFill/>
+          </a:ln>
+        </p:spPr>
+        <p:style>
+          <a:lnRef idx="2">
+            <a:schemeClr val="accent1">
+              <a:shade val="50000"/>
+            </a:schemeClr>
+          </a:lnRef>
+          <a:fillRef idx="1">
+            <a:schemeClr val="accent1"/>
+          </a:fillRef>
+          <a:effectRef idx="0">
+            <a:schemeClr val="accent1"/>
+          </a:effectRef>
+          <a:fontRef idx="minor">
+            <a:schemeClr val="lt1"/>
+          </a:fontRef>
+        </p:style>
+        <p:txBody>
+          <a:bodyPr rtlCol="0" anchor="ctr"/>
+          <a:lstStyle/>
+          <a:p>
+            <a:pPr algn="ctr"/>
+            <a:endParaRPr lang="en-US"/>
+          </a:p>
+        </p:txBody>
+      </p:sp>
+      <p:sp>
+        <p:nvSpPr>
+          <p:cNvPr id="6" name="Title 1">
+            <a:extLst>
+              <a:ext uri="{FF2B5EF4-FFF2-40B4-BE49-F238E27FC236}">
+                <a16:creationId xmlns:a16="http://schemas.microsoft.com/office/drawing/2014/main" id="{274DA77E-465B-43C2-952C-3A27252BB895}"/>
+              </a:ext>
+            </a:extLst>
+          </p:cNvPr>
+          <p:cNvSpPr txBox="1">
+            <a:spLocks/>
+          </p:cNvSpPr>
+          <p:nvPr/>
+        </p:nvSpPr>
+        <p:spPr>
+          <a:xfrm>
+            <a:off x="807919" y="1582780"/>
+            <a:ext cx="10515600" cy="1325563"/>
+          </a:xfrm>
+          <a:prstGeom prst="rect">
+            <a:avLst/>
+          </a:prstGeom>
+        </p:spPr>
+        <p:txBody>
+          <a:bodyPr/>
+          <a:lstStyle>
+            <a:lvl1pPr algn="l" defTabSz="914400" rtl="0" eaLnBrk="1" latinLnBrk="0" hangingPunct="1">
+              <a:lnSpc>
+                <a:spcPct val="90000"/>
+              </a:lnSpc>
+              <a:spcBef>
+                <a:spcPct val="0"/>
+              </a:spcBef>
+              <a:buNone/>
+              <a:defRPr sz="4400" kern="1200">
+                <a:solidFill>
+                  <a:schemeClr val="bg1">
+                    <a:lumMod val="95000"/>
+                  </a:schemeClr>
+                </a:solidFill>
+                <a:latin typeface="Futura Medium" panose="020B0602020204020303" pitchFamily="34" charset="-79"/>
+                <a:ea typeface="+mj-ea"/>
+                <a:cs typeface="Futura Medium" panose="020B0602020204020303" pitchFamily="34" charset="-79"/>
+              </a:defRPr>
+            </a:lvl1pPr>
+          </a:lstStyle>
+          <a:p>
+            <a:r>
+              <a:rPr lang="en-US" dirty="0"/>
+              <a:t>Question 1: Does orbital debris have a significant effect on insolation?</a:t>
+            </a:r>
+          </a:p>
+        </p:txBody>
+      </p:sp>
+      <p:sp>
+        <p:nvSpPr>
+          <p:cNvPr id="7" name="Title 1">
+            <a:extLst>
+              <a:ext uri="{FF2B5EF4-FFF2-40B4-BE49-F238E27FC236}">
+                <a16:creationId xmlns:a16="http://schemas.microsoft.com/office/drawing/2014/main" id="{D8BF84D6-D5D4-4D76-94DE-C58240FA772C}"/>
+              </a:ext>
+            </a:extLst>
+          </p:cNvPr>
+          <p:cNvSpPr txBox="1">
+            <a:spLocks/>
+          </p:cNvSpPr>
+          <p:nvPr/>
+        </p:nvSpPr>
+        <p:spPr>
+          <a:xfrm>
+            <a:off x="838200" y="3949657"/>
+            <a:ext cx="10515600" cy="1325563"/>
+          </a:xfrm>
+          <a:prstGeom prst="rect">
+            <a:avLst/>
+          </a:prstGeom>
+        </p:spPr>
+        <p:txBody>
+          <a:bodyPr/>
+          <a:lstStyle>
+            <a:lvl1pPr algn="l" defTabSz="914400" rtl="0" eaLnBrk="1" latinLnBrk="0" hangingPunct="1">
+              <a:lnSpc>
+                <a:spcPct val="90000"/>
+              </a:lnSpc>
+              <a:spcBef>
+                <a:spcPct val="0"/>
+              </a:spcBef>
+              <a:buNone/>
+              <a:defRPr sz="4400" kern="1200">
+                <a:solidFill>
+                  <a:schemeClr val="bg1">
+                    <a:lumMod val="95000"/>
+                  </a:schemeClr>
+                </a:solidFill>
+                <a:latin typeface="Futura Medium" panose="020B0602020204020303" pitchFamily="34" charset="-79"/>
+                <a:ea typeface="+mj-ea"/>
+                <a:cs typeface="Futura Medium" panose="020B0602020204020303" pitchFamily="34" charset="-79"/>
+              </a:defRPr>
+            </a:lvl1pPr>
+          </a:lstStyle>
+          <a:p>
+            <a:r>
+              <a:rPr lang="en-US" dirty="0"/>
+              <a:t>Question 2: If yes, could we use orbital deflectors to curb global warming?</a:t>
+            </a:r>
+          </a:p>
+        </p:txBody>
+      </p:sp>
+    </p:spTree>
+    <p:extLst>
+      <p:ext uri="{BB962C8B-B14F-4D97-AF65-F5344CB8AC3E}">
+        <p14:creationId xmlns:p14="http://schemas.microsoft.com/office/powerpoint/2010/main" val="3010847972"/>
+      </p:ext>
+    </p:extLst>
+  </p:cSld>
+  <p:clrMapOvr>
+    <a:masterClrMapping/>
+  </p:clrMapOvr>
+  <mc:AlternateContent xmlns:mc="http://schemas.openxmlformats.org/markup-compatibility/2006" xmlns:p14="http://schemas.microsoft.com/office/powerpoint/2010/main">
+    <mc:Choice Requires="p14">
+      <p:transition spd="med" p14:dur="700">
+        <p:fade/>
+      </p:transition>
+    </mc:Choice>
+    <mc:Fallback xmlns="">
+      <p:transition spd="med">
+        <p:fade/>
+      </p:transition>
+    </mc:Fallback>
+  </mc:AlternateContent>
+  <p:timing>
+    <p:tnLst>
+      <p:par>
+        <p:cTn id="1" dur="indefinite" restart="never" nodeType="tmRoot">
+          <p:childTnLst>
+            <p:seq concurrent="1" nextAc="seek">
+              <p:cTn id="2" dur="indefinite" nodeType="mainSeq">
+                <p:childTnLst>
+                  <p:par>
+                    <p:cTn id="3" fill="hold">
+                      <p:stCondLst>
+                        <p:cond delay="indefinite"/>
+                      </p:stCondLst>
+                      <p:childTnLst>
+                        <p:par>
+                          <p:cTn id="4" fill="hold">
+                            <p:stCondLst>
+                              <p:cond delay="0"/>
+                            </p:stCondLst>
+                            <p:childTnLst>
+                              <p:par>
+                                <p:cTn id="5" presetID="10" presetClass="entr" presetSubtype="0" fill="hold" grpId="0" nodeType="clickEffect">
+                                  <p:stCondLst>
+                                    <p:cond delay="0"/>
+                                  </p:stCondLst>
+                                  <p:childTnLst>
+                                    <p:set>
+                                      <p:cBhvr>
+                                        <p:cTn id="6" dur="1" fill="hold">
+                                          <p:stCondLst>
+                                            <p:cond delay="0"/>
+                                          </p:stCondLst>
+                                        </p:cTn>
+                                        <p:tgtEl>
+                                          <p:spTgt spid="4"/>
+                                        </p:tgtEl>
+                                        <p:attrNameLst>
+                                          <p:attrName>style.visibility</p:attrName>
+                                        </p:attrNameLst>
+                                      </p:cBhvr>
+                                      <p:to>
+                                        <p:strVal val="visible"/>
+                                      </p:to>
+                                    </p:set>
+                                    <p:animEffect transition="in" filter="fade">
+                                      <p:cBhvr>
+                                        <p:cTn id="7" dur="500"/>
+                                        <p:tgtEl>
+                                          <p:spTgt spid="4"/>
+                                        </p:tgtEl>
+                                      </p:cBhvr>
+                                    </p:animEffect>
+                                  </p:childTnLst>
+                                </p:cTn>
+                              </p:par>
+                            </p:childTnLst>
+                          </p:cTn>
+                        </p:par>
+                        <p:par>
+                          <p:cTn id="8" fill="hold">
+                            <p:stCondLst>
+                              <p:cond delay="500"/>
+                            </p:stCondLst>
+                            <p:childTnLst>
+                              <p:par>
+                                <p:cTn id="9" presetID="10" presetClass="entr" presetSubtype="0" fill="hold" grpId="0" nodeType="afterEffect">
+                                  <p:stCondLst>
+                                    <p:cond delay="0"/>
+                                  </p:stCondLst>
+                                  <p:childTnLst>
+                                    <p:set>
+                                      <p:cBhvr>
+                                        <p:cTn id="10" dur="1" fill="hold">
+                                          <p:stCondLst>
+                                            <p:cond delay="0"/>
+                                          </p:stCondLst>
+                                        </p:cTn>
+                                        <p:tgtEl>
+                                          <p:spTgt spid="6"/>
+                                        </p:tgtEl>
+                                        <p:attrNameLst>
+                                          <p:attrName>style.visibility</p:attrName>
+                                        </p:attrNameLst>
+                                      </p:cBhvr>
+                                      <p:to>
+                                        <p:strVal val="visible"/>
+                                      </p:to>
+                                    </p:set>
+                                    <p:animEffect transition="in" filter="fade">
+                                      <p:cBhvr>
+                                        <p:cTn id="11" dur="500"/>
+                                        <p:tgtEl>
+                                          <p:spTgt spid="6"/>
+                                        </p:tgtEl>
+                                      </p:cBhvr>
+                                    </p:animEffect>
+                                  </p:childTnLst>
+                                </p:cTn>
+                              </p:par>
+                            </p:childTnLst>
+                          </p:cTn>
+                        </p:par>
+                      </p:childTnLst>
+                    </p:cTn>
+                  </p:par>
+                  <p:par>
+                    <p:cTn id="12" fill="hold">
+                      <p:stCondLst>
+                        <p:cond delay="indefinite"/>
+                      </p:stCondLst>
+                      <p:childTnLst>
+                        <p:par>
+                          <p:cTn id="13" fill="hold">
+                            <p:stCondLst>
+                              <p:cond delay="0"/>
+                            </p:stCondLst>
+                            <p:childTnLst>
+                              <p:par>
+                                <p:cTn id="14" presetID="10" presetClass="entr" presetSubtype="0" fill="hold" grpId="0" nodeType="clickEffect">
+                                  <p:stCondLst>
+                                    <p:cond delay="0"/>
+                                  </p:stCondLst>
+                                  <p:childTnLst>
+                                    <p:set>
+                                      <p:cBhvr>
+                                        <p:cTn id="15" dur="1" fill="hold">
+                                          <p:stCondLst>
+                                            <p:cond delay="0"/>
+                                          </p:stCondLst>
+                                        </p:cTn>
+                                        <p:tgtEl>
+                                          <p:spTgt spid="7"/>
+                                        </p:tgtEl>
+                                        <p:attrNameLst>
+                                          <p:attrName>style.visibility</p:attrName>
+                                        </p:attrNameLst>
+                                      </p:cBhvr>
+                                      <p:to>
+                                        <p:strVal val="visible"/>
+                                      </p:to>
+                                    </p:set>
+                                    <p:animEffect transition="in" filter="fade">
+                                      <p:cBhvr>
+                                        <p:cTn id="16" dur="500"/>
+                                        <p:tgtEl>
+                                          <p:spTgt spid="7"/>
+                                        </p:tgtEl>
+                                      </p:cBhvr>
+                                    </p:animEffect>
+                                  </p:childTnLst>
+                                </p:cTn>
+                              </p:par>
+                            </p:childTnLst>
+                          </p:cTn>
+                        </p:par>
+                      </p:childTnLst>
+                    </p:cTn>
+                  </p:par>
+                </p:childTnLst>
+              </p:cTn>
+              <p:prevCondLst>
+                <p:cond evt="onPrev" delay="0">
+                  <p:tgtEl>
+                    <p:sldTgt/>
+                  </p:tgtEl>
+                </p:cond>
+              </p:prevCondLst>
+              <p:nextCondLst>
+                <p:cond evt="onNext" delay="0">
+                  <p:tgtEl>
+                    <p:sldTgt/>
+                  </p:tgtEl>
+                </p:cond>
+              </p:nextCondLst>
+            </p:seq>
+          </p:childTnLst>
+        </p:cTn>
+      </p:par>
+    </p:tnLst>
+    <p:bldLst>
+      <p:bldP spid="4" grpId="0" animBg="1"/>
+      <p:bldP spid="6" grpId="0"/>
+      <p:bldP spid="7" grpId="0"/>
+    </p:bldLst>
+  </p:timing>
+</p:sld>
+</file>
+
+<file path=ppt/slides/slide3.xml><?xml version="1.0" encoding="utf-8"?>
 <p:sld xmlns:a="http://schemas.openxmlformats.org/drawingml/2006/main" xmlns:r="http://schemas.openxmlformats.org/officeDocument/2006/relationships" xmlns:p="http://schemas.openxmlformats.org/presentationml/2006/main">
   <p:cSld>
     <p:spTree>
@@ -7445,7 +7872,7 @@
 </p:sld>
 </file>
 
-<file path=ppt/slides/slide3.xml><?xml version="1.0" encoding="utf-8"?>
+<file path=ppt/slides/slide4.xml><?xml version="1.0" encoding="utf-8"?>
 <p:sld xmlns:a="http://schemas.openxmlformats.org/drawingml/2006/main" xmlns:r="http://schemas.openxmlformats.org/officeDocument/2006/relationships" xmlns:p="http://schemas.openxmlformats.org/presentationml/2006/main">
   <p:cSld>
     <p:spTree>
@@ -8455,7 +8882,7 @@
 </p:sld>
 </file>
 
-<file path=ppt/slides/slide4.xml><?xml version="1.0" encoding="utf-8"?>
+<file path=ppt/slides/slide5.xml><?xml version="1.0" encoding="utf-8"?>
 <p:sld xmlns:a="http://schemas.openxmlformats.org/drawingml/2006/main" xmlns:r="http://schemas.openxmlformats.org/officeDocument/2006/relationships" xmlns:p="http://schemas.openxmlformats.org/presentationml/2006/main">
   <p:cSld>
     <p:spTree>
@@ -9631,7 +10058,7 @@
 </p:sld>
 </file>
 
-<file path=ppt/slides/slide5.xml><?xml version="1.0" encoding="utf-8"?>
+<file path=ppt/slides/slide6.xml><?xml version="1.0" encoding="utf-8"?>
 <p:sld xmlns:a="http://schemas.openxmlformats.org/drawingml/2006/main" xmlns:r="http://schemas.openxmlformats.org/officeDocument/2006/relationships" xmlns:p="http://schemas.openxmlformats.org/presentationml/2006/main">
   <p:cSld>
     <p:spTree>
@@ -9703,6 +10130,43 @@
               <a:rPr lang="en-US" dirty="0"/>
               <a:t>Orbits Plotted</a:t>
             </a:r>
+          </a:p>
+        </p:txBody>
+      </p:sp>
+      <p:sp>
+        <p:nvSpPr>
+          <p:cNvPr id="3" name="Footer Placeholder 2">
+            <a:extLst>
+              <a:ext uri="{FF2B5EF4-FFF2-40B4-BE49-F238E27FC236}">
+                <a16:creationId xmlns:a16="http://schemas.microsoft.com/office/drawing/2014/main" id="{D90DEE0E-4A2B-413C-9C3E-B87A37A4670D}"/>
+              </a:ext>
+            </a:extLst>
+          </p:cNvPr>
+          <p:cNvSpPr>
+            <a:spLocks noGrp="1"/>
+          </p:cNvSpPr>
+          <p:nvPr>
+            <p:ph type="ftr" sz="quarter" idx="11"/>
+          </p:nvPr>
+        </p:nvSpPr>
+        <p:spPr>
+          <a:xfrm>
+            <a:off x="0" y="6310312"/>
+            <a:ext cx="4114800" cy="365125"/>
+          </a:xfrm>
+        </p:spPr>
+        <p:txBody>
+          <a:bodyPr/>
+          <a:lstStyle/>
+          <a:p>
+            <a:pPr algn="l"/>
+            <a:r>
+              <a:rPr lang="en-US" dirty="0">
+                <a:hlinkClick r:id="rId3"/>
+              </a:rPr>
+              <a:t>https://www.space-track.org/</a:t>
+            </a:r>
+            <a:endParaRPr lang="en-US" dirty="0"/>
           </a:p>
         </p:txBody>
       </p:sp>
@@ -9731,7 +10195,7 @@
 </p:sld>
 </file>
 
-<file path=ppt/slides/slide6.xml><?xml version="1.0" encoding="utf-8"?>
+<file path=ppt/slides/slide7.xml><?xml version="1.0" encoding="utf-8"?>
 <p:sld xmlns:a="http://schemas.openxmlformats.org/drawingml/2006/main" xmlns:r="http://schemas.openxmlformats.org/officeDocument/2006/relationships" xmlns:p="http://schemas.openxmlformats.org/presentationml/2006/main">
   <p:cSld>
     <p:spTree>
@@ -9822,7 +10286,7 @@
                             </p:stCondLst>
                             <p:childTnLst>
                               <p:par>
-                                <p:cTn id="5" presetID="22" presetClass="entr" presetSubtype="8" repeatCount="0" fill="hold" grpId="0" nodeType="afterEffect">
+                                <p:cTn id="5" presetID="22" presetClass="entr" presetSubtype="8" fill="hold" grpId="0" nodeType="afterEffect">
                                   <p:stCondLst>
                                     <p:cond delay="0"/>
                                   </p:stCondLst>
@@ -9851,7 +10315,7 @@
                                     </p:set>
                                     <p:animEffect transition="in" filter="wipe(left)">
                                       <p:cBhvr>
-                                        <p:cTn id="7" dur="8000"/>
+                                        <p:cTn id="7" dur="6000"/>
                                         <p:tgtEl>
                                           <p:spTgt spid="4">
                                             <p:graphicEl>
@@ -9902,7 +10366,7 @@
 </p:sld>
 </file>
 
-<file path=ppt/slides/slide7.xml><?xml version="1.0" encoding="utf-8"?>
+<file path=ppt/slides/slide8.xml><?xml version="1.0" encoding="utf-8"?>
 <p:sld xmlns:a="http://schemas.openxmlformats.org/drawingml/2006/main" xmlns:r="http://schemas.openxmlformats.org/officeDocument/2006/relationships" xmlns:p="http://schemas.openxmlformats.org/presentationml/2006/main">
   <p:cSld>
     <p:spTree>
@@ -17553,7 +18017,7 @@
 </p:sld>
 </file>
 
-<file path=ppt/slides/slide8.xml><?xml version="1.0" encoding="utf-8"?>
+<file path=ppt/slides/slide9.xml><?xml version="1.0" encoding="utf-8"?>
 <p:sld xmlns:a="http://schemas.openxmlformats.org/drawingml/2006/main" xmlns:r="http://schemas.openxmlformats.org/officeDocument/2006/relationships" xmlns:p="http://schemas.openxmlformats.org/presentationml/2006/main">
   <p:cSld>
     <p:spTree>
@@ -17697,10 +18161,10 @@
       </p:sp>
       <p:grpSp>
         <p:nvGrpSpPr>
-          <p:cNvPr id="3" name="Group 2">
+          <p:cNvPr id="6" name="Group 5">
             <a:extLst>
               <a:ext uri="{FF2B5EF4-FFF2-40B4-BE49-F238E27FC236}">
-                <a16:creationId xmlns:a16="http://schemas.microsoft.com/office/drawing/2014/main" id="{118603E9-0A5D-4E4E-B07A-8501814685B4}"/>
+                <a16:creationId xmlns:a16="http://schemas.microsoft.com/office/drawing/2014/main" id="{41EADDED-302C-4856-A2EC-3933EB70E038}"/>
               </a:ext>
             </a:extLst>
           </p:cNvPr>
@@ -17709,157 +18173,202 @@
         </p:nvGrpSpPr>
         <p:grpSpPr>
           <a:xfrm>
-            <a:off x="838200" y="2644170"/>
-            <a:ext cx="5257800" cy="1569660"/>
-            <a:chOff x="838200" y="2644170"/>
-            <a:chExt cx="5257800" cy="1569660"/>
+            <a:off x="5396958" y="4083025"/>
+            <a:ext cx="2544961" cy="1834579"/>
+            <a:chOff x="5385608" y="3675252"/>
+            <a:chExt cx="2544961" cy="1834579"/>
           </a:xfrm>
         </p:grpSpPr>
         <p:sp>
           <p:nvSpPr>
-            <p:cNvPr id="9" name="TextBox 8">
+            <p:cNvPr id="4" name="Rectangle 3">
               <a:extLst>
                 <a:ext uri="{FF2B5EF4-FFF2-40B4-BE49-F238E27FC236}">
-                  <a16:creationId xmlns:a16="http://schemas.microsoft.com/office/drawing/2014/main" id="{3C99008C-AE20-724A-A366-8D8477F2DF94}"/>
+                  <a16:creationId xmlns:a16="http://schemas.microsoft.com/office/drawing/2014/main" id="{DD30C767-7EB2-4251-855E-0E83F86608E9}"/>
                 </a:ext>
               </a:extLst>
             </p:cNvPr>
-            <p:cNvSpPr txBox="1"/>
+            <p:cNvSpPr/>
             <p:nvPr/>
           </p:nvSpPr>
           <p:spPr>
             <a:xfrm>
-              <a:off x="838200" y="2644170"/>
-              <a:ext cx="2423763" cy="1569660"/>
+              <a:off x="5385608" y="3675252"/>
+              <a:ext cx="1420782" cy="1444435"/>
             </a:xfrm>
             <a:prstGeom prst="rect">
               <a:avLst/>
             </a:prstGeom>
-            <a:noFill/>
+            <a:solidFill>
+              <a:schemeClr val="bg1">
+                <a:lumMod val="85000"/>
+              </a:schemeClr>
+            </a:solidFill>
+            <a:ln>
+              <a:noFill/>
+            </a:ln>
+            <a:scene3d>
+              <a:camera prst="isometricLeftDown"/>
+              <a:lightRig rig="threePt" dir="t"/>
+            </a:scene3d>
           </p:spPr>
+          <p:style>
+            <a:lnRef idx="2">
+              <a:schemeClr val="accent1">
+                <a:shade val="50000"/>
+              </a:schemeClr>
+            </a:lnRef>
+            <a:fillRef idx="1">
+              <a:schemeClr val="accent1"/>
+            </a:fillRef>
+            <a:effectRef idx="0">
+              <a:schemeClr val="accent1"/>
+            </a:effectRef>
+            <a:fontRef idx="minor">
+              <a:schemeClr val="lt1"/>
+            </a:fontRef>
+          </p:style>
           <p:txBody>
-            <a:bodyPr wrap="square" rtlCol="0">
-              <a:spAutoFit/>
-            </a:bodyPr>
+            <a:bodyPr rtlCol="0" anchor="ctr"/>
             <a:lstStyle/>
             <a:p>
-              <a:pPr>
-                <a:spcAft>
-                  <a:spcPts val="1200"/>
-                </a:spcAft>
-              </a:pPr>
-              <a:r>
-                <a:rPr lang="en-US" sz="9600" dirty="0">
-                  <a:solidFill>
-                    <a:schemeClr val="bg1">
-                      <a:lumMod val="95000"/>
-                    </a:schemeClr>
-                  </a:solidFill>
-                  <a:latin typeface="Futura Medium" panose="020B0602020204020303" pitchFamily="34" charset="-79"/>
-                  <a:cs typeface="Futura Medium" panose="020B0602020204020303" pitchFamily="34" charset="-79"/>
-                </a:rPr>
-                <a:t>NO</a:t>
-              </a:r>
+              <a:pPr algn="ctr"/>
+              <a:endParaRPr lang="en-US"/>
             </a:p>
           </p:txBody>
         </p:sp>
         <p:sp>
           <p:nvSpPr>
-            <p:cNvPr id="10" name="TextBox 9">
+            <p:cNvPr id="11" name="Rectangle 10">
               <a:extLst>
                 <a:ext uri="{FF2B5EF4-FFF2-40B4-BE49-F238E27FC236}">
-                  <a16:creationId xmlns:a16="http://schemas.microsoft.com/office/drawing/2014/main" id="{FB1F1991-264A-2D4A-9530-9B40E0D60CEA}"/>
+                  <a16:creationId xmlns:a16="http://schemas.microsoft.com/office/drawing/2014/main" id="{B93FB1F4-CDCD-411F-B348-DF86DDEFF754}"/>
                 </a:ext>
               </a:extLst>
             </p:cNvPr>
-            <p:cNvSpPr txBox="1"/>
+            <p:cNvSpPr/>
             <p:nvPr/>
           </p:nvSpPr>
           <p:spPr>
             <a:xfrm>
-              <a:off x="3016049" y="2905780"/>
-              <a:ext cx="3079951" cy="523220"/>
+              <a:off x="6509787" y="4065396"/>
+              <a:ext cx="1420782" cy="1444435"/>
             </a:xfrm>
             <a:prstGeom prst="rect">
               <a:avLst/>
             </a:prstGeom>
-            <a:noFill/>
+            <a:solidFill>
+              <a:schemeClr val="tx1">
+                <a:lumMod val="85000"/>
+                <a:lumOff val="15000"/>
+                <a:alpha val="85000"/>
+              </a:schemeClr>
+            </a:solidFill>
+            <a:ln>
+              <a:noFill/>
+            </a:ln>
+            <a:scene3d>
+              <a:camera prst="isometricLeftDown"/>
+              <a:lightRig rig="threePt" dir="t"/>
+            </a:scene3d>
           </p:spPr>
+          <p:style>
+            <a:lnRef idx="2">
+              <a:schemeClr val="accent1">
+                <a:shade val="50000"/>
+              </a:schemeClr>
+            </a:lnRef>
+            <a:fillRef idx="1">
+              <a:schemeClr val="accent1"/>
+            </a:fillRef>
+            <a:effectRef idx="0">
+              <a:schemeClr val="accent1"/>
+            </a:effectRef>
+            <a:fontRef idx="minor">
+              <a:schemeClr val="lt1"/>
+            </a:fontRef>
+          </p:style>
           <p:txBody>
-            <a:bodyPr wrap="square" rtlCol="0">
-              <a:spAutoFit/>
-            </a:bodyPr>
+            <a:bodyPr rtlCol="0" anchor="ctr"/>
             <a:lstStyle/>
             <a:p>
-              <a:pPr>
-                <a:spcAft>
-                  <a:spcPts val="1200"/>
-                </a:spcAft>
-              </a:pPr>
-              <a:r>
-                <a:rPr lang="en-US" sz="2800" dirty="0">
-                  <a:solidFill>
-                    <a:schemeClr val="bg1">
-                      <a:lumMod val="95000"/>
-                    </a:schemeClr>
-                  </a:solidFill>
-                  <a:latin typeface="Futura Medium" panose="020B0602020204020303" pitchFamily="34" charset="-79"/>
-                  <a:cs typeface="Futura Medium" panose="020B0602020204020303" pitchFamily="34" charset="-79"/>
-                </a:rPr>
-                <a:t>Effects</a:t>
-              </a:r>
-            </a:p>
-          </p:txBody>
-        </p:sp>
-        <p:sp>
-          <p:nvSpPr>
-            <p:cNvPr id="13" name="TextBox 12">
-              <a:extLst>
-                <a:ext uri="{FF2B5EF4-FFF2-40B4-BE49-F238E27FC236}">
-                  <a16:creationId xmlns:a16="http://schemas.microsoft.com/office/drawing/2014/main" id="{E7028214-1B9B-804F-8250-3CF887E8EE0A}"/>
-                </a:ext>
-              </a:extLst>
-            </p:cNvPr>
-            <p:cNvSpPr txBox="1"/>
-            <p:nvPr/>
-          </p:nvSpPr>
-          <p:spPr>
-            <a:xfrm>
-              <a:off x="3016048" y="3429000"/>
-              <a:ext cx="3079951" cy="523220"/>
-            </a:xfrm>
-            <a:prstGeom prst="rect">
-              <a:avLst/>
-            </a:prstGeom>
-            <a:noFill/>
-          </p:spPr>
-          <p:txBody>
-            <a:bodyPr wrap="square" rtlCol="0">
-              <a:spAutoFit/>
-            </a:bodyPr>
-            <a:lstStyle/>
-            <a:p>
-              <a:pPr>
-                <a:spcAft>
-                  <a:spcPts val="1200"/>
-                </a:spcAft>
-              </a:pPr>
-              <a:r>
-                <a:rPr lang="en-US" sz="2800" dirty="0">
-                  <a:solidFill>
-                    <a:schemeClr val="bg1">
-                      <a:lumMod val="95000"/>
-                    </a:schemeClr>
-                  </a:solidFill>
-                  <a:latin typeface="Futura Medium" panose="020B0602020204020303" pitchFamily="34" charset="-79"/>
-                  <a:cs typeface="Futura Medium" panose="020B0602020204020303" pitchFamily="34" charset="-79"/>
-                </a:rPr>
-                <a:t>on Insolation</a:t>
-              </a:r>
+              <a:pPr algn="ctr"/>
+              <a:endParaRPr lang="en-US"/>
             </a:p>
           </p:txBody>
         </p:sp>
       </p:grpSp>
+      <p:sp>
+        <p:nvSpPr>
+          <p:cNvPr id="12" name="TextBox 11">
+            <a:extLst>
+              <a:ext uri="{FF2B5EF4-FFF2-40B4-BE49-F238E27FC236}">
+                <a16:creationId xmlns:a16="http://schemas.microsoft.com/office/drawing/2014/main" id="{CC75B955-C021-4913-8489-12FA567E50FA}"/>
+              </a:ext>
+            </a:extLst>
+          </p:cNvPr>
+          <p:cNvSpPr txBox="1"/>
+          <p:nvPr/>
+        </p:nvSpPr>
+        <p:spPr>
+          <a:xfrm>
+            <a:off x="838200" y="1690688"/>
+            <a:ext cx="5473701" cy="2462213"/>
+          </a:xfrm>
+          <a:prstGeom prst="rect">
+            <a:avLst/>
+          </a:prstGeom>
+          <a:noFill/>
+        </p:spPr>
+        <p:txBody>
+          <a:bodyPr wrap="square" rtlCol="0">
+            <a:spAutoFit/>
+          </a:bodyPr>
+          <a:lstStyle/>
+          <a:p>
+            <a:pPr marL="457200" indent="-457200">
+              <a:spcAft>
+                <a:spcPts val="1200"/>
+              </a:spcAft>
+              <a:buFont typeface="Arial" panose="020B0604020202020204" pitchFamily="34" charset="0"/>
+              <a:buChar char="•"/>
+            </a:pPr>
+            <a:r>
+              <a:rPr lang="en-US" sz="3600" dirty="0">
+                <a:solidFill>
+                  <a:schemeClr val="bg1">
+                    <a:lumMod val="95000"/>
+                  </a:schemeClr>
+                </a:solidFill>
+                <a:latin typeface="Futura Medium" panose="020B0602020204020303" pitchFamily="34" charset="-79"/>
+                <a:cs typeface="Futura Medium" panose="020B0602020204020303" pitchFamily="34" charset="-79"/>
+              </a:rPr>
+              <a:t>No significant effect on insolation</a:t>
+            </a:r>
+          </a:p>
+          <a:p>
+            <a:pPr marL="457200" indent="-457200">
+              <a:spcAft>
+                <a:spcPts val="1200"/>
+              </a:spcAft>
+              <a:buFont typeface="Arial" panose="020B0604020202020204" pitchFamily="34" charset="0"/>
+              <a:buChar char="•"/>
+            </a:pPr>
+            <a:r>
+              <a:rPr lang="en-US" sz="3600" dirty="0">
+                <a:solidFill>
+                  <a:schemeClr val="bg1">
+                    <a:lumMod val="95000"/>
+                  </a:schemeClr>
+                </a:solidFill>
+                <a:latin typeface="Futura Medium" panose="020B0602020204020303" pitchFamily="34" charset="-79"/>
+                <a:cs typeface="Futura Medium" panose="020B0602020204020303" pitchFamily="34" charset="-79"/>
+              </a:rPr>
+              <a:t>Orbital solar deflectors are not feasible.</a:t>
+            </a:r>
+          </a:p>
+        </p:txBody>
+      </p:sp>
     </p:spTree>
     <p:extLst>
       <p:ext uri="{BB962C8B-B14F-4D97-AF65-F5344CB8AC3E}">
@@ -17964,20 +18473,67 @@
                             </p:stCondLst>
                             <p:childTnLst>
                               <p:par>
-                                <p:cTn id="10" presetID="10" presetClass="entr" presetSubtype="0" fill="hold" nodeType="clickEffect">
+                                <p:cTn id="10" presetID="10" presetClass="exit" presetSubtype="0" fill="hold" grpId="0" nodeType="clickEffect">
+                                  <p:stCondLst>
+                                    <p:cond delay="0"/>
+                                  </p:stCondLst>
+                                  <p:childTnLst>
+                                    <p:animEffect transition="out" filter="fade">
+                                      <p:cBhvr>
+                                        <p:cTn id="11" dur="500"/>
+                                        <p:tgtEl>
+                                          <p:spTgt spid="8">
+                                            <p:txEl>
+                                              <p:pRg st="0" end="0"/>
+                                            </p:txEl>
+                                          </p:spTgt>
+                                        </p:tgtEl>
+                                      </p:cBhvr>
+                                    </p:animEffect>
+                                    <p:set>
+                                      <p:cBhvr>
+                                        <p:cTn id="12" dur="1" fill="hold">
+                                          <p:stCondLst>
+                                            <p:cond delay="499"/>
+                                          </p:stCondLst>
+                                        </p:cTn>
+                                        <p:tgtEl>
+                                          <p:spTgt spid="8">
+                                            <p:txEl>
+                                              <p:pRg st="0" end="0"/>
+                                            </p:txEl>
+                                          </p:spTgt>
+                                        </p:tgtEl>
+                                        <p:attrNameLst>
+                                          <p:attrName>style.visibility</p:attrName>
+                                        </p:attrNameLst>
+                                      </p:cBhvr>
+                                      <p:to>
+                                        <p:strVal val="hidden"/>
+                                      </p:to>
+                                    </p:set>
+                                  </p:childTnLst>
+                                </p:cTn>
+                              </p:par>
+                              <p:par>
+                                <p:cTn id="13" presetID="10" presetClass="entr" presetSubtype="0" fill="hold" nodeType="withEffect">
                                   <p:stCondLst>
                                     <p:cond delay="0"/>
                                   </p:stCondLst>
                                   <p:childTnLst>
                                     <p:set>
                                       <p:cBhvr>
-                                        <p:cTn id="11" dur="1" fill="hold">
+                                        <p:cTn id="14" dur="1" fill="hold">
                                           <p:stCondLst>
                                             <p:cond delay="0"/>
                                           </p:stCondLst>
                                         </p:cTn>
                                         <p:tgtEl>
-                                          <p:spTgt spid="3"/>
+                                          <p:spTgt spid="12">
+                                            <p:txEl>
+                                              <p:pRg st="0" end="0"/>
+                                            </p:txEl>
+                                          </p:spTgt>
                                         </p:tgtEl>
                                         <p:attrNameLst>
                                           <p:attrName>style.visibility</p:attrName>
@@ -17989,9 +18545,238 @@
                                     </p:set>
                                     <p:animEffect transition="in" filter="fade">
                                       <p:cBhvr>
-                                        <p:cTn id="12" dur="500"/>
-                                        <p:tgtEl>
-                                          <p:spTgt spid="3"/>
+                                        <p:cTn id="15" dur="500"/>
+                                        <p:tgtEl>
+                                          <p:spTgt spid="12">
+                                            <p:txEl>
+                                              <p:pRg st="0" end="0"/>
+                                            </p:txEl>
+                                          </p:spTgt>
+                                        </p:tgtEl>
+                                      </p:cBhvr>
+                                    </p:animEffect>
+                                  </p:childTnLst>
+                                </p:cTn>
+                              </p:par>
+                            </p:childTnLst>
+                          </p:cTn>
+                        </p:par>
+                      </p:childTnLst>
+                    </p:cTn>
+                  </p:par>
+                  <p:par>
+                    <p:cTn id="16" fill="hold">
+                      <p:stCondLst>
+                        <p:cond delay="indefinite"/>
+                      </p:stCondLst>
+                      <p:childTnLst>
+                        <p:par>
+                          <p:cTn id="17" fill="hold">
+                            <p:stCondLst>
+                              <p:cond delay="0"/>
+                            </p:stCondLst>
+                            <p:childTnLst>
+                              <p:par>
+                                <p:cTn id="18" presetID="2" presetClass="entr" presetSubtype="4" fill="hold" nodeType="clickEffect">
+                                  <p:stCondLst>
+                                    <p:cond delay="0"/>
+                                  </p:stCondLst>
+                                  <p:childTnLst>
+                                    <p:set>
+                                      <p:cBhvr>
+                                        <p:cTn id="19" dur="1" fill="hold">
+                                          <p:stCondLst>
+                                            <p:cond delay="0"/>
+                                          </p:stCondLst>
+                                        </p:cTn>
+                                        <p:tgtEl>
+                                          <p:spTgt spid="6"/>
+                                        </p:tgtEl>
+                                        <p:attrNameLst>
+                                          <p:attrName>style.visibility</p:attrName>
+                                        </p:attrNameLst>
+                                      </p:cBhvr>
+                                      <p:to>
+                                        <p:strVal val="visible"/>
+                                      </p:to>
+                                    </p:set>
+                                    <p:anim calcmode="lin" valueType="num">
+                                      <p:cBhvr additive="base">
+                                        <p:cTn id="20" dur="500" fill="hold"/>
+                                        <p:tgtEl>
+                                          <p:spTgt spid="6"/>
+                                        </p:tgtEl>
+                                        <p:attrNameLst>
+                                          <p:attrName>ppt_x</p:attrName>
+                                        </p:attrNameLst>
+                                      </p:cBhvr>
+                                      <p:tavLst>
+                                        <p:tav tm="0">
+                                          <p:val>
+                                            <p:strVal val="#ppt_x"/>
+                                          </p:val>
+                                        </p:tav>
+                                        <p:tav tm="100000">
+                                          <p:val>
+                                            <p:strVal val="#ppt_x"/>
+                                          </p:val>
+                                        </p:tav>
+                                      </p:tavLst>
+                                    </p:anim>
+                                    <p:anim calcmode="lin" valueType="num">
+                                      <p:cBhvr additive="base">
+                                        <p:cTn id="21" dur="500" fill="hold"/>
+                                        <p:tgtEl>
+                                          <p:spTgt spid="6"/>
+                                        </p:tgtEl>
+                                        <p:attrNameLst>
+                                          <p:attrName>ppt_y</p:attrName>
+                                        </p:attrNameLst>
+                                      </p:cBhvr>
+                                      <p:tavLst>
+                                        <p:tav tm="0">
+                                          <p:val>
+                                            <p:strVal val="1+#ppt_h/2"/>
+                                          </p:val>
+                                        </p:tav>
+                                        <p:tav tm="100000">
+                                          <p:val>
+                                            <p:strVal val="#ppt_y"/>
+                                          </p:val>
+                                        </p:tav>
+                                      </p:tavLst>
+                                    </p:anim>
+                                  </p:childTnLst>
+                                </p:cTn>
+                              </p:par>
+                            </p:childTnLst>
+                          </p:cTn>
+                        </p:par>
+                      </p:childTnLst>
+                    </p:cTn>
+                  </p:par>
+                  <p:par>
+                    <p:cTn id="22" fill="hold">
+                      <p:stCondLst>
+                        <p:cond delay="indefinite"/>
+                      </p:stCondLst>
+                      <p:childTnLst>
+                        <p:par>
+                          <p:cTn id="23" fill="hold">
+                            <p:stCondLst>
+                              <p:cond delay="0"/>
+                            </p:stCondLst>
+                            <p:childTnLst>
+                              <p:par>
+                                <p:cTn id="24" presetID="2" presetClass="exit" presetSubtype="1" fill="hold" nodeType="clickEffect">
+                                  <p:stCondLst>
+                                    <p:cond delay="0"/>
+                                  </p:stCondLst>
+                                  <p:childTnLst>
+                                    <p:anim calcmode="lin" valueType="num">
+                                      <p:cBhvr additive="base">
+                                        <p:cTn id="25" dur="500"/>
+                                        <p:tgtEl>
+                                          <p:spTgt spid="6"/>
+                                        </p:tgtEl>
+                                        <p:attrNameLst>
+                                          <p:attrName>ppt_x</p:attrName>
+                                        </p:attrNameLst>
+                                      </p:cBhvr>
+                                      <p:tavLst>
+                                        <p:tav tm="0">
+                                          <p:val>
+                                            <p:strVal val="ppt_x"/>
+                                          </p:val>
+                                        </p:tav>
+                                        <p:tav tm="100000">
+                                          <p:val>
+                                            <p:strVal val="ppt_x"/>
+                                          </p:val>
+                                        </p:tav>
+                                      </p:tavLst>
+                                    </p:anim>
+                                    <p:anim calcmode="lin" valueType="num">
+                                      <p:cBhvr additive="base">
+                                        <p:cTn id="26" dur="500"/>
+                                        <p:tgtEl>
+                                          <p:spTgt spid="6"/>
+                                        </p:tgtEl>
+                                        <p:attrNameLst>
+                                          <p:attrName>ppt_y</p:attrName>
+                                        </p:attrNameLst>
+                                      </p:cBhvr>
+                                      <p:tavLst>
+                                        <p:tav tm="0">
+                                          <p:val>
+                                            <p:strVal val="ppt_y"/>
+                                          </p:val>
+                                        </p:tav>
+                                        <p:tav tm="100000">
+                                          <p:val>
+                                            <p:strVal val="0-ppt_h/2"/>
+                                          </p:val>
+                                        </p:tav>
+                                      </p:tavLst>
+                                    </p:anim>
+                                    <p:set>
+                                      <p:cBhvr>
+                                        <p:cTn id="27" dur="1" fill="hold">
+                                          <p:stCondLst>
+                                            <p:cond delay="499"/>
+                                          </p:stCondLst>
+                                        </p:cTn>
+                                        <p:tgtEl>
+                                          <p:spTgt spid="6"/>
+                                        </p:tgtEl>
+                                        <p:attrNameLst>
+                                          <p:attrName>style.visibility</p:attrName>
+                                        </p:attrNameLst>
+                                      </p:cBhvr>
+                                      <p:to>
+                                        <p:strVal val="hidden"/>
+                                      </p:to>
+                                    </p:set>
+                                  </p:childTnLst>
+                                </p:cTn>
+                              </p:par>
+                              <p:par>
+                                <p:cTn id="28" presetID="10" presetClass="entr" presetSubtype="0" fill="hold" nodeType="withEffect">
+                                  <p:stCondLst>
+                                    <p:cond delay="0"/>
+                                  </p:stCondLst>
+                                  <p:childTnLst>
+                                    <p:set>
+                                      <p:cBhvr>
+                                        <p:cTn id="29" dur="1" fill="hold">
+                                          <p:stCondLst>
+                                            <p:cond delay="0"/>
+                                          </p:stCondLst>
+                                        </p:cTn>
+                                        <p:tgtEl>
+                                          <p:spTgt spid="12">
+                                            <p:txEl>
+                                              <p:pRg st="1" end="1"/>
+                                            </p:txEl>
+                                          </p:spTgt>
+                                        </p:tgtEl>
+                                        <p:attrNameLst>
+                                          <p:attrName>style.visibility</p:attrName>
+                                        </p:attrNameLst>
+                                      </p:cBhvr>
+                                      <p:to>
+                                        <p:strVal val="visible"/>
+                                      </p:to>
+                                    </p:set>
+                                    <p:animEffect transition="in" filter="fade">
+                                      <p:cBhvr>
+                                        <p:cTn id="30" dur="500"/>
+                                        <p:tgtEl>
+                                          <p:spTgt spid="12">
+                                            <p:txEl>
+                                              <p:pRg st="1" end="1"/>
+                                            </p:txEl>
+                                          </p:spTgt>
                                         </p:tgtEl>
                                       </p:cBhvr>
                                     </p:animEffect>
@@ -18025,6 +18810,9 @@
         </p:cTn>
       </p:par>
     </p:tnLst>
+    <p:bldLst>
+      <p:bldP spid="8" grpId="0" build="allAtOnce"/>
+    </p:bldLst>
   </p:timing>
 </p:sld>
 </file>

</xml_diff>

<commit_message>
Finished rough rough draft of paper and added some references
</commit_message>
<xml_diff>
--- a/Presentation/OrbitalDebrisPresentation.pptx
+++ b/Presentation/OrbitalDebrisPresentation.pptx
@@ -2287,7 +2287,7 @@
           <a:p>
             <a:fld id="{222597E0-90FD-CF4C-8A28-806BAB807E22}" type="datetimeFigureOut">
               <a:rPr lang="en-US" smtClean="0"/>
-              <a:t>4/9/2019</a:t>
+              <a:t>4/11/2019</a:t>
             </a:fld>
             <a:endParaRPr lang="en-US"/>
           </a:p>
@@ -2785,7 +2785,7 @@
           <a:p>
             <a:fld id="{24921E90-DCBB-3C4E-9920-10E8BF6775BE}" type="datetimeFigureOut">
               <a:rPr lang="en-US" smtClean="0"/>
-              <a:t>4/9/2019</a:t>
+              <a:t>4/11/2019</a:t>
             </a:fld>
             <a:endParaRPr lang="en-US"/>
           </a:p>
@@ -2995,7 +2995,7 @@
           <a:p>
             <a:fld id="{24921E90-DCBB-3C4E-9920-10E8BF6775BE}" type="datetimeFigureOut">
               <a:rPr lang="en-US" smtClean="0"/>
-              <a:t>4/9/2019</a:t>
+              <a:t>4/11/2019</a:t>
             </a:fld>
             <a:endParaRPr lang="en-US"/>
           </a:p>
@@ -3215,7 +3215,7 @@
           <a:p>
             <a:fld id="{24921E90-DCBB-3C4E-9920-10E8BF6775BE}" type="datetimeFigureOut">
               <a:rPr lang="en-US" smtClean="0"/>
-              <a:t>4/9/2019</a:t>
+              <a:t>4/11/2019</a:t>
             </a:fld>
             <a:endParaRPr lang="en-US"/>
           </a:p>
@@ -3425,7 +3425,7 @@
           <a:p>
             <a:fld id="{24921E90-DCBB-3C4E-9920-10E8BF6775BE}" type="datetimeFigureOut">
               <a:rPr lang="en-US" smtClean="0"/>
-              <a:t>4/9/2019</a:t>
+              <a:t>4/11/2019</a:t>
             </a:fld>
             <a:endParaRPr lang="en-US"/>
           </a:p>
@@ -3712,7 +3712,7 @@
           <a:p>
             <a:fld id="{24921E90-DCBB-3C4E-9920-10E8BF6775BE}" type="datetimeFigureOut">
               <a:rPr lang="en-US" smtClean="0"/>
-              <a:t>4/9/2019</a:t>
+              <a:t>4/11/2019</a:t>
             </a:fld>
             <a:endParaRPr lang="en-US"/>
           </a:p>
@@ -3989,7 +3989,7 @@
           <a:p>
             <a:fld id="{24921E90-DCBB-3C4E-9920-10E8BF6775BE}" type="datetimeFigureOut">
               <a:rPr lang="en-US" smtClean="0"/>
-              <a:t>4/9/2019</a:t>
+              <a:t>4/11/2019</a:t>
             </a:fld>
             <a:endParaRPr lang="en-US"/>
           </a:p>
@@ -4413,7 +4413,7 @@
           <a:p>
             <a:fld id="{24921E90-DCBB-3C4E-9920-10E8BF6775BE}" type="datetimeFigureOut">
               <a:rPr lang="en-US" smtClean="0"/>
-              <a:t>4/9/2019</a:t>
+              <a:t>4/11/2019</a:t>
             </a:fld>
             <a:endParaRPr lang="en-US"/>
           </a:p>
@@ -4566,7 +4566,7 @@
           <a:p>
             <a:fld id="{24921E90-DCBB-3C4E-9920-10E8BF6775BE}" type="datetimeFigureOut">
               <a:rPr lang="en-US" smtClean="0"/>
-              <a:t>4/9/2019</a:t>
+              <a:t>4/11/2019</a:t>
             </a:fld>
             <a:endParaRPr lang="en-US"/>
           </a:p>
@@ -4691,7 +4691,7 @@
           <a:p>
             <a:fld id="{24921E90-DCBB-3C4E-9920-10E8BF6775BE}" type="datetimeFigureOut">
               <a:rPr lang="en-US" smtClean="0"/>
-              <a:t>4/9/2019</a:t>
+              <a:t>4/11/2019</a:t>
             </a:fld>
             <a:endParaRPr lang="en-US"/>
           </a:p>
@@ -5014,7 +5014,7 @@
           <a:p>
             <a:fld id="{24921E90-DCBB-3C4E-9920-10E8BF6775BE}" type="datetimeFigureOut">
               <a:rPr lang="en-US" smtClean="0"/>
-              <a:t>4/9/2019</a:t>
+              <a:t>4/11/2019</a:t>
             </a:fld>
             <a:endParaRPr lang="en-US"/>
           </a:p>
@@ -5314,7 +5314,7 @@
           <a:p>
             <a:fld id="{24921E90-DCBB-3C4E-9920-10E8BF6775BE}" type="datetimeFigureOut">
               <a:rPr lang="en-US" smtClean="0"/>
-              <a:t>4/9/2019</a:t>
+              <a:t>4/11/2019</a:t>
             </a:fld>
             <a:endParaRPr lang="en-US"/>
           </a:p>
@@ -5573,7 +5573,7 @@
           <a:p>
             <a:fld id="{24921E90-DCBB-3C4E-9920-10E8BF6775BE}" type="datetimeFigureOut">
               <a:rPr lang="en-US" smtClean="0"/>
-              <a:t>4/9/2019</a:t>
+              <a:t>4/11/2019</a:t>
             </a:fld>
             <a:endParaRPr lang="en-US"/>
           </a:p>
@@ -6462,7 +6462,7 @@
           <a:p>
             <a:r>
               <a:rPr lang="en-US" dirty="0"/>
-              <a:t>Question 2: If yes, could we use orbital deflectors to curb global warming?</a:t>
+              <a:t>Question 2: If yes, could we use orbital reflectors to curb global warming?</a:t>
             </a:r>
           </a:p>
         </p:txBody>

</xml_diff>